<commit_message>
- added app icons - created images for Play Store
</commit_message>
<xml_diff>
--- a/documentation/files/image-files.pptx
+++ b/documentation/files/image-files.pptx
@@ -5,7 +5,7 @@
     <p:sldMasterId id="2147483648" r:id="rId1"/>
   </p:sldMasterIdLst>
   <p:sldIdLst>
-    <p:sldId id="256" r:id="rId2"/>
+    <p:sldId id="258" r:id="rId2"/>
     <p:sldId id="257" r:id="rId3"/>
   </p:sldIdLst>
   <p:sldSz cx="12192000" cy="6858000"/>
@@ -271,7 +271,7 @@
           <a:p>
             <a:fld id="{87528E11-A72F-442B-85F4-46B8167B2619}" type="datetimeFigureOut">
               <a:rPr lang="de-DE" smtClean="0"/>
-              <a:t>02.06.2022</a:t>
+              <a:t>17.01.2024</a:t>
             </a:fld>
             <a:endParaRPr lang="de-DE"/>
           </a:p>
@@ -469,7 +469,7 @@
           <a:p>
             <a:fld id="{87528E11-A72F-442B-85F4-46B8167B2619}" type="datetimeFigureOut">
               <a:rPr lang="de-DE" smtClean="0"/>
-              <a:t>02.06.2022</a:t>
+              <a:t>17.01.2024</a:t>
             </a:fld>
             <a:endParaRPr lang="de-DE"/>
           </a:p>
@@ -677,7 +677,7 @@
           <a:p>
             <a:fld id="{87528E11-A72F-442B-85F4-46B8167B2619}" type="datetimeFigureOut">
               <a:rPr lang="de-DE" smtClean="0"/>
-              <a:t>02.06.2022</a:t>
+              <a:t>17.01.2024</a:t>
             </a:fld>
             <a:endParaRPr lang="de-DE"/>
           </a:p>
@@ -875,7 +875,7 @@
           <a:p>
             <a:fld id="{87528E11-A72F-442B-85F4-46B8167B2619}" type="datetimeFigureOut">
               <a:rPr lang="de-DE" smtClean="0"/>
-              <a:t>02.06.2022</a:t>
+              <a:t>17.01.2024</a:t>
             </a:fld>
             <a:endParaRPr lang="de-DE"/>
           </a:p>
@@ -1150,7 +1150,7 @@
           <a:p>
             <a:fld id="{87528E11-A72F-442B-85F4-46B8167B2619}" type="datetimeFigureOut">
               <a:rPr lang="de-DE" smtClean="0"/>
-              <a:t>02.06.2022</a:t>
+              <a:t>17.01.2024</a:t>
             </a:fld>
             <a:endParaRPr lang="de-DE"/>
           </a:p>
@@ -1415,7 +1415,7 @@
           <a:p>
             <a:fld id="{87528E11-A72F-442B-85F4-46B8167B2619}" type="datetimeFigureOut">
               <a:rPr lang="de-DE" smtClean="0"/>
-              <a:t>02.06.2022</a:t>
+              <a:t>17.01.2024</a:t>
             </a:fld>
             <a:endParaRPr lang="de-DE"/>
           </a:p>
@@ -1827,7 +1827,7 @@
           <a:p>
             <a:fld id="{87528E11-A72F-442B-85F4-46B8167B2619}" type="datetimeFigureOut">
               <a:rPr lang="de-DE" smtClean="0"/>
-              <a:t>02.06.2022</a:t>
+              <a:t>17.01.2024</a:t>
             </a:fld>
             <a:endParaRPr lang="de-DE"/>
           </a:p>
@@ -1968,7 +1968,7 @@
           <a:p>
             <a:fld id="{87528E11-A72F-442B-85F4-46B8167B2619}" type="datetimeFigureOut">
               <a:rPr lang="de-DE" smtClean="0"/>
-              <a:t>02.06.2022</a:t>
+              <a:t>17.01.2024</a:t>
             </a:fld>
             <a:endParaRPr lang="de-DE"/>
           </a:p>
@@ -2081,7 +2081,7 @@
           <a:p>
             <a:fld id="{87528E11-A72F-442B-85F4-46B8167B2619}" type="datetimeFigureOut">
               <a:rPr lang="de-DE" smtClean="0"/>
-              <a:t>02.06.2022</a:t>
+              <a:t>17.01.2024</a:t>
             </a:fld>
             <a:endParaRPr lang="de-DE"/>
           </a:p>
@@ -2392,7 +2392,7 @@
           <a:p>
             <a:fld id="{87528E11-A72F-442B-85F4-46B8167B2619}" type="datetimeFigureOut">
               <a:rPr lang="de-DE" smtClean="0"/>
-              <a:t>02.06.2022</a:t>
+              <a:t>17.01.2024</a:t>
             </a:fld>
             <a:endParaRPr lang="de-DE"/>
           </a:p>
@@ -2680,7 +2680,7 @@
           <a:p>
             <a:fld id="{87528E11-A72F-442B-85F4-46B8167B2619}" type="datetimeFigureOut">
               <a:rPr lang="de-DE" smtClean="0"/>
-              <a:t>02.06.2022</a:t>
+              <a:t>17.01.2024</a:t>
             </a:fld>
             <a:endParaRPr lang="de-DE"/>
           </a:p>
@@ -2921,7 +2921,7 @@
           <a:p>
             <a:fld id="{87528E11-A72F-442B-85F4-46B8167B2619}" type="datetimeFigureOut">
               <a:rPr lang="de-DE" smtClean="0"/>
-              <a:t>02.06.2022</a:t>
+              <a:t>17.01.2024</a:t>
             </a:fld>
             <a:endParaRPr lang="de-DE"/>
           </a:p>
@@ -3340,15 +3340,15 @@
       </p:grpSpPr>
       <p:pic>
         <p:nvPicPr>
-          <p:cNvPr id="7" name="Grafik 6">
-            <a:extLst>
-              <a:ext uri="{FF2B5EF4-FFF2-40B4-BE49-F238E27FC236}">
-                <a16:creationId xmlns:a16="http://schemas.microsoft.com/office/drawing/2014/main" id="{473684CC-3BC2-4C18-A6AB-70FE674DF2B8}"/>
+          <p:cNvPr id="1026" name="Picture 2" descr="https://lh3.googleusercontent.com/pw/ABLVV842vp_mChmlMXQLguZ9TsnTmePXpYzswX-qYB53WRqjpXmshiVWdnysUPp8RhS5KPvuvxenMULrF1hOuPHfe4-2VN5EpaDiMoyU5oB4I4cufxxzKQIgtz8kFrX0OEd-7dNGICmOmiG_neIauLXCo7Q7OAjNrkt1Wojgtz0catnPmGsuknopGcCKTtutQQbuzJCRI4jY2uVwh7oMdf7lcFTOzG8kMdwHU9wNv0RIJTzWFLRTCorqj5nLichwXpSelf7X1_cbYB6SgDEkXC1VIQYLEoMuiLQZY4K_885KoCpZVjyN-HlBGLF-Q6nYFUOhswIOZdeUuGUInu7wvaOcjtZCSnPan4B_VLRJ-dYX1jF9jNxX5LPJi0v87Gk23e3O3W0KlVqg-Vvsjv6tvrm_ckW3geWS0d7fDXK2ly1YWFNjo4XpWNZ1BXQM9iB30cvzlgbtBgfUmGvAfSHHCgBWPr6d6npQ7Zngk4vgpg7eey0_fgy0cDDGwJx_g7OHq0cV7MqM_ArWbcoSesl3PYZJVNjG14pwQaWau912LTkDxozPae9it9nyVu2v6TFbTOOXx0zyIXB_OlGR_z-pLILy2peDAxOWlsSQxY1ZDd7bC3d18rtPgFl-tbLe6-kFUJbHIGcpQ249-1-_qlUBjwEZ7ScvhtdYDNQaavQlbTa0aIy5uoaj9-L-1PQf5C_gZutLjZYQGxAM4Xkv2S9qTL2W8zonnQ5eolmKf-lk17Zi5lbG35ufqPebhMsfZUVTYqgtdiLQfSt7S3D09ewCoOEyIrIeZRFJ8WL7q678GDTnROEikaaMwZzC0yJvUCcTuT2hJE2ur69nVwONi13lmCOjMW5lCyaJBwMHPKzHUw1ANqd8eOEAIV5lHJxMabaYI9QSqH61pMnU20Ix7Q0G8Nnp3dPbVtzl-vvPlc-Bzpo6s-KwLnNt9bR5h21Cw4DfDi__TY9NdlL1HzEy=w576-h1279-s-no-gm?authuser=0">
+            <a:extLst>
+              <a:ext uri="{FF2B5EF4-FFF2-40B4-BE49-F238E27FC236}">
+                <a16:creationId xmlns:a16="http://schemas.microsoft.com/office/drawing/2014/main" id="{7BA4B39F-BBA9-4051-8F1B-F0D476A57869}"/>
               </a:ext>
             </a:extLst>
           </p:cNvPr>
           <p:cNvPicPr>
-            <a:picLocks noChangeAspect="1"/>
+            <a:picLocks noChangeAspect="1" noChangeArrowheads="1"/>
           </p:cNvPicPr>
           <p:nvPr/>
         </p:nvPicPr>
@@ -3360,31 +3360,47 @@
               </a:ext>
             </a:extLst>
           </a:blip>
+          <a:srcRect/>
           <a:stretch>
             <a:fillRect/>
           </a:stretch>
         </p:blipFill>
-        <p:spPr>
+        <p:spPr bwMode="auto">
           <a:xfrm>
-            <a:off x="3574317" y="0"/>
-            <a:ext cx="3165231" cy="6858000"/>
+            <a:off x="0" y="0"/>
+            <a:ext cx="3089275" cy="6858000"/>
           </a:xfrm>
           <a:prstGeom prst="rect">
             <a:avLst/>
           </a:prstGeom>
+          <a:noFill/>
+          <a:ln>
+            <a:solidFill>
+              <a:srgbClr val="FB8C09"/>
+            </a:solidFill>
+          </a:ln>
+          <a:extLst>
+            <a:ext uri="{909E8E84-426E-40DD-AFC4-6F175D3DCCD1}">
+              <a14:hiddenFill xmlns:a14="http://schemas.microsoft.com/office/drawing/2010/main">
+                <a:solidFill>
+                  <a:srgbClr val="FFFFFF"/>
+                </a:solidFill>
+              </a14:hiddenFill>
+            </a:ext>
+          </a:extLst>
         </p:spPr>
       </p:pic>
       <p:pic>
         <p:nvPicPr>
-          <p:cNvPr id="9" name="Grafik 8">
-            <a:extLst>
-              <a:ext uri="{FF2B5EF4-FFF2-40B4-BE49-F238E27FC236}">
-                <a16:creationId xmlns:a16="http://schemas.microsoft.com/office/drawing/2014/main" id="{B389E310-6C65-4114-9D49-520CDAA67825}"/>
+          <p:cNvPr id="1030" name="Picture 6" descr="https://lh3.googleusercontent.com/pw/ABLVV85PNY9JDt65xM4n33bhkpwwwH7qc44aR9nXZdI_nH3O3zoYjf13DUIGVxhjcRw6_Tc8bH8-IwGM-0BOjXpEzso7xmHcMtWMcWY-wNRQVGax0T3XECLK6uO2XQ__v0Os_yObLQ1uTENCOs6Js_GB-MS3rdJazuyOk25YFQD-_pMUVas1kafe5TifziQQp_HlRKXeO-reCespzjm8NL2MyFmUTLLZeRZevyJgS4Y4oD4I2btEobVZLfu68yUt8cGlP-4CoG-gm8KNUE81Yqsqxo25hCf32UX5H35xw2aCpPn7Wiy86eXPbzixJ3uIjzEU1UGQpx6K_CV6JTUxsvPashloRKJqr_8V4kC239dvyfFSRBJfcd-0kugGW8ZSYjzIXXcpTTBsFrRRxKjvAqdKgwpQcUdMY6c6Qyh_4zr4qonXjooCsgrR9m6brSxmSYjar76lqRPvTtzl4r8sSOPPVZ5jQlhdQqHUhXYRIGdkt_LKO4ETC6V3TRILJ3PLlmDHWnCrR0JC5UbBd90KudkOws9Rq-_JSmOMCUEbaak2Q1pICIcrDLOKkGc_TOd1kWJObsE4YVNOeSjnUVE3IutDHhRNnZCR6q7WHilSU3r2hdO77TorUC79Ddz7GidqQhUXw9rInpge5wsH6vFHlUP9g2U7EpEYCiAjB05PFaXzY_Tmrbh6c8J5-A-az-7dg7fK7Ija34DlHA44BuQrNwIIyk9dkWAdsYi0ej1oJJzUon62ZrZqqqvpypuZ7q2-621AWi9OZ7AzxDOMJuqVjaE8zKTDmXxYRfTziXuOi9mDrKfcZ8QfALuU8LmasL2hF_DU1KIsXdCML3atFxSuaY0T2n61TjZZ8djIYLvG8UmvY3QnFq-wbbEWvsT3eRTI_Cbe9p4qEBHnSHUQe_FRZ0Ic3kwYprgrte6Y_oZP2YJYQSJCr5NCtfPOsY4eBTOxRvm6YnwxAiGAoCg8=w576-h1279-s-no-gm?authuser=0">
+            <a:extLst>
+              <a:ext uri="{FF2B5EF4-FFF2-40B4-BE49-F238E27FC236}">
+                <a16:creationId xmlns:a16="http://schemas.microsoft.com/office/drawing/2014/main" id="{D1864906-99C5-4428-91EE-2F382059DE0A}"/>
               </a:ext>
             </a:extLst>
           </p:cNvPr>
           <p:cNvPicPr>
-            <a:picLocks noChangeAspect="1"/>
+            <a:picLocks noChangeAspect="1" noChangeArrowheads="1"/>
           </p:cNvPicPr>
           <p:nvPr/>
         </p:nvPicPr>
@@ -3396,31 +3412,47 @@
               </a:ext>
             </a:extLst>
           </a:blip>
+          <a:srcRect/>
           <a:stretch>
             <a:fillRect/>
           </a:stretch>
         </p:blipFill>
-        <p:spPr>
+        <p:spPr bwMode="auto">
           <a:xfrm>
-            <a:off x="7148634" y="0"/>
-            <a:ext cx="3165231" cy="6858000"/>
+            <a:off x="3615531" y="0"/>
+            <a:ext cx="3089275" cy="6858000"/>
           </a:xfrm>
           <a:prstGeom prst="rect">
             <a:avLst/>
           </a:prstGeom>
+          <a:noFill/>
+          <a:ln>
+            <a:solidFill>
+              <a:srgbClr val="FB8C09"/>
+            </a:solidFill>
+          </a:ln>
+          <a:extLst>
+            <a:ext uri="{909E8E84-426E-40DD-AFC4-6F175D3DCCD1}">
+              <a14:hiddenFill xmlns:a14="http://schemas.microsoft.com/office/drawing/2010/main">
+                <a:solidFill>
+                  <a:srgbClr val="FFFFFF"/>
+                </a:solidFill>
+              </a14:hiddenFill>
+            </a:ext>
+          </a:extLst>
         </p:spPr>
       </p:pic>
       <p:pic>
         <p:nvPicPr>
-          <p:cNvPr id="3" name="Grafik 2">
-            <a:extLst>
-              <a:ext uri="{FF2B5EF4-FFF2-40B4-BE49-F238E27FC236}">
-                <a16:creationId xmlns:a16="http://schemas.microsoft.com/office/drawing/2014/main" id="{BEE21D65-BA0B-4476-A19E-B8CDE9014251}"/>
+          <p:cNvPr id="1032" name="Picture 8" descr="https://lh3.googleusercontent.com/pw/ABLVV857OUZcG2QGyBcapq5zGR4YHJlKiJDAv7f2VrUFB0UtCXvpdRflCwz5beHGfscj-SyaZaEBoMpJANQNB7dHr5bSHI-BznSp1QeujzatVe0o2E5ZiFcM2uhFFVExcAee0VHfKH7FKSqsp-yzfXFlxTV1VE_8uA7r5N-JlV5hBvwhg2hDOEnajB13MMrUsT6XRM8g8TLF30DIia8-mfiamZcR817aUXwj7NyKG5h9bb-Jq7PGlTlluGodA8bZDtEklVyayeohmwyH0cpDdo2-A_jvlhu0Mg8R0A_SUy-TvWXTbzE_glAmFmntMuGdFS9IuQnpm_xb-63C-vg6Jy_FqLmZs4iQLHxQ6g_Qf90hJ7XeFAmY1WRLYSOpri5ZwGjsd4_3jgiWJ12yLoi2ejc6ojJNx3PMf_Pl9ArHVjPIlJTy4D4wmJECk8LqOqMfSAjzQ5m_8RZk3zcNWbr7C1Z9-ujSKHB2cHVuHD_-RD-5YhoTaZZXCxYsnzWRxEhc8Q-flHzNgo5e1HIk2j6IjQgws3ejCH4rV3lnmi8fY0EvOiTCvsCBMr6Pea4T3bMu_TFk2nEKbUaw8ZZLxFbvBAKYloxo-T4qOtJeNUX224CJVnhsnlJEVb23EDHzJ3BjBo-o0mVTVE9hRoTQQbz6Sj8YtALL6HhD6r6kp2mJFKlCSlOR52Xj85pewGnE79pnLAyI044ziJq-WO2eJEsS5ZxOMfvDCZd4CKbGvxTNls1ebFMoj-oJDiSeLJR2Ip5nI9mTfpBVIJ9xHBglDmI02Uha9ZT6nh5UNq85MHR-WXfCTtTvzvpTJxnDuQOR7UdV1Fv7WJrn-0gEqhPjamKq5oAh6ZKhwMIIQvSbor2AfiS20-KRX09h0w3smsjy4gDc-igsIT9SyRBibkDGPz_GqQDQFdJuC7DGm9DyyL8bQuOt-h-IQiyLePrfiYqKfKCwAWg3u-dAwwLCJglH=w576-h1279-s-no-gm?authuser=0">
+            <a:extLst>
+              <a:ext uri="{FF2B5EF4-FFF2-40B4-BE49-F238E27FC236}">
+                <a16:creationId xmlns:a16="http://schemas.microsoft.com/office/drawing/2014/main" id="{C8A997EF-4050-485F-8992-524DCE8D7439}"/>
               </a:ext>
             </a:extLst>
           </p:cNvPr>
           <p:cNvPicPr>
-            <a:picLocks noChangeAspect="1"/>
+            <a:picLocks noChangeAspect="1" noChangeArrowheads="1"/>
           </p:cNvPicPr>
           <p:nvPr/>
         </p:nvPicPr>
@@ -3432,24 +3464,40 @@
               </a:ext>
             </a:extLst>
           </a:blip>
+          <a:srcRect/>
           <a:stretch>
             <a:fillRect/>
           </a:stretch>
         </p:blipFill>
-        <p:spPr>
+        <p:spPr bwMode="auto">
           <a:xfrm>
-            <a:off x="0" y="0"/>
-            <a:ext cx="3165231" cy="6858000"/>
+            <a:off x="7231062" y="0"/>
+            <a:ext cx="3089275" cy="6858000"/>
           </a:xfrm>
           <a:prstGeom prst="rect">
             <a:avLst/>
           </a:prstGeom>
+          <a:noFill/>
+          <a:ln>
+            <a:solidFill>
+              <a:srgbClr val="FB8C09"/>
+            </a:solidFill>
+          </a:ln>
+          <a:extLst>
+            <a:ext uri="{909E8E84-426E-40DD-AFC4-6F175D3DCCD1}">
+              <a14:hiddenFill xmlns:a14="http://schemas.microsoft.com/office/drawing/2010/main">
+                <a:solidFill>
+                  <a:srgbClr val="FFFFFF"/>
+                </a:solidFill>
+              </a14:hiddenFill>
+            </a:ext>
+          </a:extLst>
         </p:spPr>
       </p:pic>
     </p:spTree>
     <p:extLst>
       <p:ext uri="{BB962C8B-B14F-4D97-AF65-F5344CB8AC3E}">
-        <p14:creationId xmlns:p14="http://schemas.microsoft.com/office/powerpoint/2010/main" val="1459935219"/>
+        <p14:creationId xmlns:p14="http://schemas.microsoft.com/office/powerpoint/2010/main" val="597521548"/>
       </p:ext>
     </p:extLst>
   </p:cSld>
@@ -3478,10 +3526,10 @@
       </p:grpSpPr>
       <p:pic>
         <p:nvPicPr>
-          <p:cNvPr id="9" name="Grafik 8">
-            <a:extLst>
-              <a:ext uri="{FF2B5EF4-FFF2-40B4-BE49-F238E27FC236}">
-                <a16:creationId xmlns:a16="http://schemas.microsoft.com/office/drawing/2014/main" id="{1A308113-6092-4B88-8FDD-E8CDAA0D03E1}"/>
+          <p:cNvPr id="3" name="Grafik 2">
+            <a:extLst>
+              <a:ext uri="{FF2B5EF4-FFF2-40B4-BE49-F238E27FC236}">
+                <a16:creationId xmlns:a16="http://schemas.microsoft.com/office/drawing/2014/main" id="{A13C0D25-A6D3-40D7-BFF7-B58145D9D733}"/>
               </a:ext>
             </a:extLst>
           </p:cNvPr>
@@ -3504,8 +3552,8 @@
         </p:blipFill>
         <p:spPr>
           <a:xfrm>
-            <a:off x="8334368" y="1907632"/>
-            <a:ext cx="2159016" cy="2222516"/>
+            <a:off x="5441950" y="1408071"/>
+            <a:ext cx="1929430" cy="1968806"/>
           </a:xfrm>
           <a:prstGeom prst="rect">
             <a:avLst/>
@@ -3514,10 +3562,10 @@
       </p:pic>
       <p:pic>
         <p:nvPicPr>
-          <p:cNvPr id="11" name="Grafik 10">
-            <a:extLst>
-              <a:ext uri="{FF2B5EF4-FFF2-40B4-BE49-F238E27FC236}">
-                <a16:creationId xmlns:a16="http://schemas.microsoft.com/office/drawing/2014/main" id="{927054DD-F9A6-4C52-97B2-06BB86F6494D}"/>
+          <p:cNvPr id="5" name="Grafik 4">
+            <a:extLst>
+              <a:ext uri="{FF2B5EF4-FFF2-40B4-BE49-F238E27FC236}">
+                <a16:creationId xmlns:a16="http://schemas.microsoft.com/office/drawing/2014/main" id="{E964E801-703C-4BA2-AD91-1F5C05368F08}"/>
               </a:ext>
             </a:extLst>
           </p:cNvPr>
@@ -3540,8 +3588,8 @@
         </p:blipFill>
         <p:spPr>
           <a:xfrm>
-            <a:off x="470866" y="778253"/>
-            <a:ext cx="6773533" cy="3006347"/>
+            <a:off x="5441950" y="0"/>
+            <a:ext cx="1929430" cy="1086198"/>
           </a:xfrm>
           <a:prstGeom prst="rect">
             <a:avLst/>
@@ -3550,49 +3598,143 @@
       </p:pic>
       <p:pic>
         <p:nvPicPr>
-          <p:cNvPr id="1026" name="Picture 2" descr="https://www.digitale-technologien.de/DT/Redaktion/EN/Bilder/Smarte_Datenwirtschaft/SDW_Logo_en.png;jsessionid=9817B522B5133B1BC2CC4B9B1A31DE23?__blob=normal&amp;v=1">
-            <a:extLst>
-              <a:ext uri="{FF2B5EF4-FFF2-40B4-BE49-F238E27FC236}">
-                <a16:creationId xmlns:a16="http://schemas.microsoft.com/office/drawing/2014/main" id="{573853F2-0D06-41C8-B65E-9F519EA5BDB8}"/>
+          <p:cNvPr id="7" name="Grafik 6">
+            <a:extLst>
+              <a:ext uri="{FF2B5EF4-FFF2-40B4-BE49-F238E27FC236}">
+                <a16:creationId xmlns:a16="http://schemas.microsoft.com/office/drawing/2014/main" id="{3AE08D5A-5566-4B72-BD1D-9AB59C5D60E1}"/>
               </a:ext>
             </a:extLst>
           </p:cNvPr>
           <p:cNvPicPr>
-            <a:picLocks noChangeAspect="1" noChangeArrowheads="1"/>
+            <a:picLocks noChangeAspect="1"/>
+          </p:cNvPicPr>
+          <p:nvPr/>
+        </p:nvPicPr>
+        <p:blipFill rotWithShape="1">
+          <a:blip r:embed="rId4">
+            <a:extLst>
+              <a:ext uri="{28A0092B-C50C-407E-A947-70E740481C1C}">
+                <a14:useLocalDpi xmlns:a14="http://schemas.microsoft.com/office/drawing/2010/main" val="0"/>
+              </a:ext>
+            </a:extLst>
+          </a:blip>
+          <a:srcRect t="10722" b="11185"/>
+          <a:stretch/>
+        </p:blipFill>
+        <p:spPr>
+          <a:xfrm>
+            <a:off x="0" y="0"/>
+            <a:ext cx="5441950" cy="2392474"/>
+          </a:xfrm>
+          <a:prstGeom prst="rect">
+            <a:avLst/>
+          </a:prstGeom>
+        </p:spPr>
+      </p:pic>
+      <p:pic>
+        <p:nvPicPr>
+          <p:cNvPr id="10" name="Grafik 9">
+            <a:extLst>
+              <a:ext uri="{FF2B5EF4-FFF2-40B4-BE49-F238E27FC236}">
+                <a16:creationId xmlns:a16="http://schemas.microsoft.com/office/drawing/2014/main" id="{A1B67D4D-F67E-472A-B759-05D3C2877AC7}"/>
+              </a:ext>
+            </a:extLst>
+          </p:cNvPr>
+          <p:cNvPicPr>
+            <a:picLocks noChangeAspect="1"/>
+          </p:cNvPicPr>
+          <p:nvPr/>
+        </p:nvPicPr>
+        <p:blipFill rotWithShape="1">
+          <a:blip r:embed="rId5">
+            <a:extLst>
+              <a:ext uri="{28A0092B-C50C-407E-A947-70E740481C1C}">
+                <a14:useLocalDpi xmlns:a14="http://schemas.microsoft.com/office/drawing/2010/main" val="0"/>
+              </a:ext>
+            </a:extLst>
+          </a:blip>
+          <a:srcRect l="13258" t="20913" r="13631" b="21035"/>
+          <a:stretch/>
+        </p:blipFill>
+        <p:spPr>
+          <a:xfrm>
+            <a:off x="78651" y="2661178"/>
+            <a:ext cx="1123950" cy="588844"/>
+          </a:xfrm>
+          <a:prstGeom prst="rect">
+            <a:avLst/>
+          </a:prstGeom>
+        </p:spPr>
+      </p:pic>
+      <p:pic>
+        <p:nvPicPr>
+          <p:cNvPr id="13" name="Grafik 12">
+            <a:extLst>
+              <a:ext uri="{FF2B5EF4-FFF2-40B4-BE49-F238E27FC236}">
+                <a16:creationId xmlns:a16="http://schemas.microsoft.com/office/drawing/2014/main" id="{1125BD57-9463-49BD-A61F-3AB863268EF0}"/>
+              </a:ext>
+            </a:extLst>
+          </p:cNvPr>
+          <p:cNvPicPr>
+            <a:picLocks noChangeAspect="1"/>
           </p:cNvPicPr>
           <p:nvPr/>
         </p:nvPicPr>
         <p:blipFill>
-          <a:blip r:embed="rId4">
+          <a:blip r:embed="rId6">
             <a:extLst>
               <a:ext uri="{28A0092B-C50C-407E-A947-70E740481C1C}">
                 <a14:useLocalDpi xmlns:a14="http://schemas.microsoft.com/office/drawing/2010/main" val="0"/>
               </a:ext>
             </a:extLst>
           </a:blip>
-          <a:srcRect/>
           <a:stretch>
             <a:fillRect/>
           </a:stretch>
         </p:blipFill>
-        <p:spPr bwMode="auto">
+        <p:spPr>
           <a:xfrm>
-            <a:off x="7699375" y="120650"/>
-            <a:ext cx="2884394" cy="1676400"/>
+            <a:off x="1863419" y="2661178"/>
+            <a:ext cx="1041289" cy="588844"/>
           </a:xfrm>
           <a:prstGeom prst="rect">
             <a:avLst/>
           </a:prstGeom>
-          <a:noFill/>
-          <a:extLst>
-            <a:ext uri="{909E8E84-426E-40DD-AFC4-6F175D3DCCD1}">
-              <a14:hiddenFill xmlns:a14="http://schemas.microsoft.com/office/drawing/2010/main">
-                <a:solidFill>
-                  <a:srgbClr val="FFFFFF"/>
-                </a:solidFill>
-              </a14:hiddenFill>
-            </a:ext>
-          </a:extLst>
+        </p:spPr>
+      </p:pic>
+      <p:pic>
+        <p:nvPicPr>
+          <p:cNvPr id="15" name="Grafik 14">
+            <a:extLst>
+              <a:ext uri="{FF2B5EF4-FFF2-40B4-BE49-F238E27FC236}">
+                <a16:creationId xmlns:a16="http://schemas.microsoft.com/office/drawing/2014/main" id="{BBC8C034-887A-4BD0-AC3D-68D4F1BE60C6}"/>
+              </a:ext>
+            </a:extLst>
+          </p:cNvPr>
+          <p:cNvPicPr>
+            <a:picLocks noChangeAspect="1"/>
+          </p:cNvPicPr>
+          <p:nvPr/>
+        </p:nvPicPr>
+        <p:blipFill rotWithShape="1">
+          <a:blip r:embed="rId7">
+            <a:extLst>
+              <a:ext uri="{28A0092B-C50C-407E-A947-70E740481C1C}">
+                <a14:useLocalDpi xmlns:a14="http://schemas.microsoft.com/office/drawing/2010/main" val="0"/>
+              </a:ext>
+            </a:extLst>
+          </a:blip>
+          <a:srcRect t="12808" b="12807"/>
+          <a:stretch/>
+        </p:blipFill>
+        <p:spPr>
+          <a:xfrm>
+            <a:off x="3565525" y="2661178"/>
+            <a:ext cx="1876425" cy="588844"/>
+          </a:xfrm>
+          <a:prstGeom prst="rect">
+            <a:avLst/>
+          </a:prstGeom>
         </p:spPr>
       </p:pic>
     </p:spTree>

</xml_diff>